<commit_message>
MAJ 15/02/2018 Signed-off-by: DrBlaf <chauveau.aurelien.76@gmail.com>
</commit_message>
<xml_diff>
--- a/Rapport/Lore/presentation_revu.pptx
+++ b/Rapport/Lore/presentation_revu.pptx
@@ -19,8 +19,9 @@
     <p:sldId id="264" r:id="rId13"/>
     <p:sldId id="271" r:id="rId14"/>
     <p:sldId id="265" r:id="rId15"/>
-    <p:sldId id="269" r:id="rId16"/>
-    <p:sldId id="270" r:id="rId17"/>
+    <p:sldId id="272" r:id="rId16"/>
+    <p:sldId id="269" r:id="rId17"/>
+    <p:sldId id="270" r:id="rId18"/>
   </p:sldIdLst>
   <p:sldSz cx="9144000" cy="5715000" type="screen16x10"/>
   <p:notesSz cx="6858000" cy="9144000"/>
@@ -507,7 +508,7 @@
             <a:fld id="{7385B5F2-299D-41E4-81B4-55AECBC730DC}" type="datetimeFigureOut">
               <a:rPr lang="fr-FR" smtClean="0"/>
               <a:pPr/>
-              <a:t>14/02/2018</a:t>
+              <a:t>15/02/2018</a:t>
             </a:fld>
             <a:endParaRPr lang="fr-FR"/>
           </a:p>
@@ -674,7 +675,7 @@
             <a:fld id="{7385B5F2-299D-41E4-81B4-55AECBC730DC}" type="datetimeFigureOut">
               <a:rPr lang="fr-FR" smtClean="0"/>
               <a:pPr/>
-              <a:t>14/02/2018</a:t>
+              <a:t>15/02/2018</a:t>
             </a:fld>
             <a:endParaRPr lang="fr-FR"/>
           </a:p>
@@ -851,7 +852,7 @@
             <a:fld id="{7385B5F2-299D-41E4-81B4-55AECBC730DC}" type="datetimeFigureOut">
               <a:rPr lang="fr-FR" smtClean="0"/>
               <a:pPr/>
-              <a:t>14/02/2018</a:t>
+              <a:t>15/02/2018</a:t>
             </a:fld>
             <a:endParaRPr lang="fr-FR"/>
           </a:p>
@@ -1022,7 +1023,7 @@
             <a:fld id="{7385B5F2-299D-41E4-81B4-55AECBC730DC}" type="datetimeFigureOut">
               <a:rPr lang="fr-FR" smtClean="0"/>
               <a:pPr/>
-              <a:t>14/02/2018</a:t>
+              <a:t>15/02/2018</a:t>
             </a:fld>
             <a:endParaRPr lang="fr-FR"/>
           </a:p>
@@ -1486,7 +1487,7 @@
             <a:fld id="{7385B5F2-299D-41E4-81B4-55AECBC730DC}" type="datetimeFigureOut">
               <a:rPr lang="fr-FR" smtClean="0"/>
               <a:pPr/>
-              <a:t>14/02/2018</a:t>
+              <a:t>15/02/2018</a:t>
             </a:fld>
             <a:endParaRPr lang="fr-FR"/>
           </a:p>
@@ -1752,7 +1753,7 @@
             <a:fld id="{7385B5F2-299D-41E4-81B4-55AECBC730DC}" type="datetimeFigureOut">
               <a:rPr lang="fr-FR" smtClean="0"/>
               <a:pPr/>
-              <a:t>14/02/2018</a:t>
+              <a:t>15/02/2018</a:t>
             </a:fld>
             <a:endParaRPr lang="fr-FR"/>
           </a:p>
@@ -2128,7 +2129,7 @@
             <a:fld id="{7385B5F2-299D-41E4-81B4-55AECBC730DC}" type="datetimeFigureOut">
               <a:rPr lang="fr-FR" smtClean="0"/>
               <a:pPr/>
-              <a:t>14/02/2018</a:t>
+              <a:t>15/02/2018</a:t>
             </a:fld>
             <a:endParaRPr lang="fr-FR"/>
           </a:p>
@@ -2252,7 +2253,7 @@
             <a:fld id="{7385B5F2-299D-41E4-81B4-55AECBC730DC}" type="datetimeFigureOut">
               <a:rPr lang="fr-FR" smtClean="0"/>
               <a:pPr/>
-              <a:t>14/02/2018</a:t>
+              <a:t>15/02/2018</a:t>
             </a:fld>
             <a:endParaRPr lang="fr-FR"/>
           </a:p>
@@ -2344,7 +2345,7 @@
             <a:fld id="{7385B5F2-299D-41E4-81B4-55AECBC730DC}" type="datetimeFigureOut">
               <a:rPr lang="fr-FR" smtClean="0"/>
               <a:pPr/>
-              <a:t>14/02/2018</a:t>
+              <a:t>15/02/2018</a:t>
             </a:fld>
             <a:endParaRPr lang="fr-FR"/>
           </a:p>
@@ -2595,7 +2596,7 @@
             <a:fld id="{7385B5F2-299D-41E4-81B4-55AECBC730DC}" type="datetimeFigureOut">
               <a:rPr lang="fr-FR" smtClean="0"/>
               <a:pPr/>
-              <a:t>14/02/2018</a:t>
+              <a:t>15/02/2018</a:t>
             </a:fld>
             <a:endParaRPr lang="fr-FR"/>
           </a:p>
@@ -2856,7 +2857,7 @@
             <a:fld id="{7385B5F2-299D-41E4-81B4-55AECBC730DC}" type="datetimeFigureOut">
               <a:rPr lang="fr-FR" smtClean="0"/>
               <a:pPr/>
-              <a:t>14/02/2018</a:t>
+              <a:t>15/02/2018</a:t>
             </a:fld>
             <a:endParaRPr lang="fr-FR"/>
           </a:p>
@@ -3262,7 +3263,7 @@
             <a:fld id="{7385B5F2-299D-41E4-81B4-55AECBC730DC}" type="datetimeFigureOut">
               <a:rPr lang="fr-FR" smtClean="0"/>
               <a:pPr/>
-              <a:t>14/02/2018</a:t>
+              <a:t>15/02/2018</a:t>
             </a:fld>
             <a:endParaRPr lang="fr-FR"/>
           </a:p>
@@ -4467,49 +4468,7 @@
                   </a:outerShdw>
                 </a:effectLst>
               </a:rPr>
-              <a:t>Mon rôle dans </a:t>
-            </a:r>
-            <a:r>
-              <a:rPr lang="fr-FR" dirty="0" smtClean="0">
-                <a:ln w="18415" cmpd="sng">
-                  <a:solidFill>
-                    <a:srgbClr val="FFFFFF"/>
-                  </a:solidFill>
-                  <a:prstDash val="solid"/>
-                </a:ln>
-                <a:solidFill>
-                  <a:srgbClr val="FFFFFF"/>
-                </a:solidFill>
-                <a:effectLst>
-                  <a:outerShdw blurRad="63500" dir="3600000" algn="tl" rotWithShape="0">
-                    <a:srgbClr val="000000">
-                      <a:alpha val="70000"/>
-                    </a:srgbClr>
-                  </a:outerShdw>
-                </a:effectLst>
-              </a:rPr>
-              <a:t>ce </a:t>
-            </a:r>
-            <a:r>
-              <a:rPr lang="fr-FR" dirty="0" smtClean="0">
-                <a:ln w="18415" cmpd="sng">
-                  <a:solidFill>
-                    <a:srgbClr val="FFFFFF"/>
-                  </a:solidFill>
-                  <a:prstDash val="solid"/>
-                </a:ln>
-                <a:solidFill>
-                  <a:srgbClr val="FFFFFF"/>
-                </a:solidFill>
-                <a:effectLst>
-                  <a:outerShdw blurRad="63500" dir="3600000" algn="tl" rotWithShape="0">
-                    <a:srgbClr val="000000">
-                      <a:alpha val="70000"/>
-                    </a:srgbClr>
-                  </a:outerShdw>
-                </a:effectLst>
-              </a:rPr>
-              <a:t>projet</a:t>
+              <a:t>Mon rôle dans ce projet</a:t>
             </a:r>
             <a:endParaRPr lang="fr-FR" dirty="0">
               <a:ln w="18415" cmpd="sng">
@@ -5124,6 +5083,154 @@
           </a:p>
         </p:txBody>
       </p:sp>
+      <p:pic>
+        <p:nvPicPr>
+          <p:cNvPr id="10" name="Image 9"/>
+          <p:cNvPicPr/>
+          <p:nvPr/>
+        </p:nvPicPr>
+        <p:blipFill>
+          <a:blip r:embed="rId4"/>
+          <a:srcRect/>
+          <a:stretch>
+            <a:fillRect/>
+          </a:stretch>
+        </p:blipFill>
+        <p:spPr bwMode="auto">
+          <a:xfrm>
+            <a:off x="285720" y="642922"/>
+            <a:ext cx="3118205" cy="4829522"/>
+          </a:xfrm>
+          <a:prstGeom prst="rect">
+            <a:avLst/>
+          </a:prstGeom>
+          <a:ln w="38100" cap="sq">
+            <a:solidFill>
+              <a:schemeClr val="accent2"/>
+            </a:solidFill>
+            <a:prstDash val="solid"/>
+            <a:miter lim="800000"/>
+          </a:ln>
+          <a:effectLst>
+            <a:outerShdw blurRad="50800" dist="38100" dir="2700000" algn="tl" rotWithShape="0">
+              <a:srgbClr val="000000">
+                <a:alpha val="43000"/>
+              </a:srgbClr>
+            </a:outerShdw>
+          </a:effectLst>
+        </p:spPr>
+      </p:pic>
+      <p:pic>
+        <p:nvPicPr>
+          <p:cNvPr id="11" name="Image 10"/>
+          <p:cNvPicPr/>
+          <p:nvPr/>
+        </p:nvPicPr>
+        <p:blipFill>
+          <a:blip r:embed="rId5"/>
+          <a:srcRect/>
+          <a:stretch>
+            <a:fillRect/>
+          </a:stretch>
+        </p:blipFill>
+        <p:spPr bwMode="auto">
+          <a:xfrm>
+            <a:off x="2571736" y="3143252"/>
+            <a:ext cx="1583937" cy="2083782"/>
+          </a:xfrm>
+          <a:prstGeom prst="rect">
+            <a:avLst/>
+          </a:prstGeom>
+          <a:ln w="38100" cap="sq">
+            <a:solidFill>
+              <a:schemeClr val="accent2"/>
+            </a:solidFill>
+            <a:prstDash val="solid"/>
+            <a:miter lim="800000"/>
+          </a:ln>
+          <a:effectLst>
+            <a:outerShdw blurRad="50800" dist="38100" dir="2700000" algn="tl" rotWithShape="0">
+              <a:srgbClr val="000000">
+                <a:alpha val="43000"/>
+              </a:srgbClr>
+            </a:outerShdw>
+          </a:effectLst>
+        </p:spPr>
+      </p:pic>
+      <p:pic>
+        <p:nvPicPr>
+          <p:cNvPr id="12" name="Image 11"/>
+          <p:cNvPicPr/>
+          <p:nvPr/>
+        </p:nvPicPr>
+        <p:blipFill>
+          <a:blip r:embed="rId6"/>
+          <a:srcRect/>
+          <a:stretch>
+            <a:fillRect/>
+          </a:stretch>
+        </p:blipFill>
+        <p:spPr bwMode="auto">
+          <a:xfrm>
+            <a:off x="4572000" y="285732"/>
+            <a:ext cx="2714644" cy="5214953"/>
+          </a:xfrm>
+          <a:prstGeom prst="rect">
+            <a:avLst/>
+          </a:prstGeom>
+          <a:ln w="38100" cap="sq">
+            <a:solidFill>
+              <a:schemeClr val="accent2"/>
+            </a:solidFill>
+            <a:prstDash val="solid"/>
+            <a:miter lim="800000"/>
+          </a:ln>
+          <a:effectLst>
+            <a:outerShdw blurRad="50800" dist="38100" dir="2700000" algn="tl" rotWithShape="0">
+              <a:srgbClr val="000000">
+                <a:alpha val="43000"/>
+              </a:srgbClr>
+            </a:outerShdw>
+          </a:effectLst>
+        </p:spPr>
+      </p:pic>
+      <p:pic>
+        <p:nvPicPr>
+          <p:cNvPr id="13" name="Image 12"/>
+          <p:cNvPicPr/>
+          <p:nvPr/>
+        </p:nvPicPr>
+        <p:blipFill>
+          <a:blip r:embed="rId7"/>
+          <a:srcRect/>
+          <a:stretch>
+            <a:fillRect/>
+          </a:stretch>
+        </p:blipFill>
+        <p:spPr bwMode="auto">
+          <a:xfrm>
+            <a:off x="7215206" y="2357434"/>
+            <a:ext cx="1177637" cy="3036982"/>
+          </a:xfrm>
+          <a:prstGeom prst="rect">
+            <a:avLst/>
+          </a:prstGeom>
+          <a:ln w="38100" cap="sq">
+            <a:solidFill>
+              <a:schemeClr val="accent2"/>
+            </a:solidFill>
+            <a:prstDash val="solid"/>
+            <a:miter lim="800000"/>
+          </a:ln>
+          <a:effectLst>
+            <a:outerShdw blurRad="50800" dist="38100" dir="2700000" algn="tl" rotWithShape="0">
+              <a:srgbClr val="000000">
+                <a:alpha val="43000"/>
+              </a:srgbClr>
+            </a:outerShdw>
+          </a:effectLst>
+        </p:spPr>
+      </p:pic>
     </p:spTree>
   </p:cSld>
   <p:clrMapOvr>
@@ -5156,6 +5263,31 @@
           <a:chExt cx="0" cy="0"/>
         </a:xfrm>
       </p:grpSpPr>
+    </p:spTree>
+  </p:cSld>
+  <p:clrMapOvr>
+    <a:masterClrMapping/>
+  </p:clrMapOvr>
+</p:sld>
+</file>
+
+<file path=ppt/slides/slide16.xml><?xml version="1.0" encoding="utf-8"?>
+<p:sld xmlns:a="http://schemas.openxmlformats.org/drawingml/2006/main" xmlns:r="http://schemas.openxmlformats.org/officeDocument/2006/relationships" xmlns:p="http://schemas.openxmlformats.org/presentationml/2006/main">
+  <p:cSld>
+    <p:spTree>
+      <p:nvGrpSpPr>
+        <p:cNvPr id="1" name=""/>
+        <p:cNvGrpSpPr/>
+        <p:nvPr/>
+      </p:nvGrpSpPr>
+      <p:grpSpPr>
+        <a:xfrm>
+          <a:off x="0" y="0"/>
+          <a:ext cx="0" cy="0"/>
+          <a:chOff x="0" y="0"/>
+          <a:chExt cx="0" cy="0"/>
+        </a:xfrm>
+      </p:grpSpPr>
       <p:sp>
         <p:nvSpPr>
           <p:cNvPr id="4" name="Titre 1"/>
@@ -5417,7 +5549,7 @@
 </p:sld>
 </file>
 
-<file path=ppt/slides/slide16.xml><?xml version="1.0" encoding="utf-8"?>
+<file path=ppt/slides/slide17.xml><?xml version="1.0" encoding="utf-8"?>
 <p:sld xmlns:a="http://schemas.openxmlformats.org/drawingml/2006/main" xmlns:r="http://schemas.openxmlformats.org/officeDocument/2006/relationships" xmlns:p="http://schemas.openxmlformats.org/presentationml/2006/main">
   <p:cSld>
     <p:spTree>

</xml_diff>